<commit_message>
Uploading files for final project. Please see folder called Final Project Submission - Erin Eidschun
</commit_message>
<xml_diff>
--- a/Projects/Write_up/tree_diagram.pptx
+++ b/Projects/Write_up/tree_diagram.pptx
@@ -7,6 +7,8 @@
   <p:sldIdLst>
     <p:sldId id="256" r:id="rId2"/>
     <p:sldId id="257" r:id="rId3"/>
+    <p:sldId id="258" r:id="rId4"/>
+    <p:sldId id="259" r:id="rId5"/>
   </p:sldIdLst>
   <p:sldSz cx="12192000" cy="6858000"/>
   <p:notesSz cx="6858000" cy="9144000"/>
@@ -262,7 +264,7 @@
               <a:rPr lang="en-US" smtClean="0"/>
               <a:t>3/11/20</a:t>
             </a:fld>
-            <a:endParaRPr lang="en-US"/>
+            <a:endParaRPr lang="en-US" dirty="0"/>
           </a:p>
         </p:txBody>
       </p:sp>
@@ -287,7 +289,7 @@
           <a:bodyPr/>
           <a:lstStyle/>
           <a:p>
-            <a:endParaRPr lang="en-US"/>
+            <a:endParaRPr lang="en-US" dirty="0"/>
           </a:p>
         </p:txBody>
       </p:sp>
@@ -316,7 +318,7 @@
               <a:rPr lang="en-US" smtClean="0"/>
               <a:t>‹#›</a:t>
             </a:fld>
-            <a:endParaRPr lang="en-US"/>
+            <a:endParaRPr lang="en-US" dirty="0"/>
           </a:p>
         </p:txBody>
       </p:sp>
@@ -460,7 +462,7 @@
               <a:rPr lang="en-US" smtClean="0"/>
               <a:t>3/11/20</a:t>
             </a:fld>
-            <a:endParaRPr lang="en-US"/>
+            <a:endParaRPr lang="en-US" dirty="0"/>
           </a:p>
         </p:txBody>
       </p:sp>
@@ -485,7 +487,7 @@
           <a:bodyPr/>
           <a:lstStyle/>
           <a:p>
-            <a:endParaRPr lang="en-US"/>
+            <a:endParaRPr lang="en-US" dirty="0"/>
           </a:p>
         </p:txBody>
       </p:sp>
@@ -514,7 +516,7 @@
               <a:rPr lang="en-US" smtClean="0"/>
               <a:t>‹#›</a:t>
             </a:fld>
-            <a:endParaRPr lang="en-US"/>
+            <a:endParaRPr lang="en-US" dirty="0"/>
           </a:p>
         </p:txBody>
       </p:sp>
@@ -668,7 +670,7 @@
               <a:rPr lang="en-US" smtClean="0"/>
               <a:t>3/11/20</a:t>
             </a:fld>
-            <a:endParaRPr lang="en-US"/>
+            <a:endParaRPr lang="en-US" dirty="0"/>
           </a:p>
         </p:txBody>
       </p:sp>
@@ -693,7 +695,7 @@
           <a:bodyPr/>
           <a:lstStyle/>
           <a:p>
-            <a:endParaRPr lang="en-US"/>
+            <a:endParaRPr lang="en-US" dirty="0"/>
           </a:p>
         </p:txBody>
       </p:sp>
@@ -722,7 +724,7 @@
               <a:rPr lang="en-US" smtClean="0"/>
               <a:t>‹#›</a:t>
             </a:fld>
-            <a:endParaRPr lang="en-US"/>
+            <a:endParaRPr lang="en-US" dirty="0"/>
           </a:p>
         </p:txBody>
       </p:sp>
@@ -866,7 +868,7 @@
               <a:rPr lang="en-US" smtClean="0"/>
               <a:t>3/11/20</a:t>
             </a:fld>
-            <a:endParaRPr lang="en-US"/>
+            <a:endParaRPr lang="en-US" dirty="0"/>
           </a:p>
         </p:txBody>
       </p:sp>
@@ -891,7 +893,7 @@
           <a:bodyPr/>
           <a:lstStyle/>
           <a:p>
-            <a:endParaRPr lang="en-US"/>
+            <a:endParaRPr lang="en-US" dirty="0"/>
           </a:p>
         </p:txBody>
       </p:sp>
@@ -920,7 +922,7 @@
               <a:rPr lang="en-US" smtClean="0"/>
               <a:t>‹#›</a:t>
             </a:fld>
-            <a:endParaRPr lang="en-US"/>
+            <a:endParaRPr lang="en-US" dirty="0"/>
           </a:p>
         </p:txBody>
       </p:sp>
@@ -1141,7 +1143,7 @@
               <a:rPr lang="en-US" smtClean="0"/>
               <a:t>3/11/20</a:t>
             </a:fld>
-            <a:endParaRPr lang="en-US"/>
+            <a:endParaRPr lang="en-US" dirty="0"/>
           </a:p>
         </p:txBody>
       </p:sp>
@@ -1166,7 +1168,7 @@
           <a:bodyPr/>
           <a:lstStyle/>
           <a:p>
-            <a:endParaRPr lang="en-US"/>
+            <a:endParaRPr lang="en-US" dirty="0"/>
           </a:p>
         </p:txBody>
       </p:sp>
@@ -1195,7 +1197,7 @@
               <a:rPr lang="en-US" smtClean="0"/>
               <a:t>‹#›</a:t>
             </a:fld>
-            <a:endParaRPr lang="en-US"/>
+            <a:endParaRPr lang="en-US" dirty="0"/>
           </a:p>
         </p:txBody>
       </p:sp>
@@ -1406,7 +1408,7 @@
               <a:rPr lang="en-US" smtClean="0"/>
               <a:t>3/11/20</a:t>
             </a:fld>
-            <a:endParaRPr lang="en-US"/>
+            <a:endParaRPr lang="en-US" dirty="0"/>
           </a:p>
         </p:txBody>
       </p:sp>
@@ -1431,7 +1433,7 @@
           <a:bodyPr/>
           <a:lstStyle/>
           <a:p>
-            <a:endParaRPr lang="en-US"/>
+            <a:endParaRPr lang="en-US" dirty="0"/>
           </a:p>
         </p:txBody>
       </p:sp>
@@ -1460,7 +1462,7 @@
               <a:rPr lang="en-US" smtClean="0"/>
               <a:t>‹#›</a:t>
             </a:fld>
-            <a:endParaRPr lang="en-US"/>
+            <a:endParaRPr lang="en-US" dirty="0"/>
           </a:p>
         </p:txBody>
       </p:sp>
@@ -1818,7 +1820,7 @@
               <a:rPr lang="en-US" smtClean="0"/>
               <a:t>3/11/20</a:t>
             </a:fld>
-            <a:endParaRPr lang="en-US"/>
+            <a:endParaRPr lang="en-US" dirty="0"/>
           </a:p>
         </p:txBody>
       </p:sp>
@@ -1843,7 +1845,7 @@
           <a:bodyPr/>
           <a:lstStyle/>
           <a:p>
-            <a:endParaRPr lang="en-US"/>
+            <a:endParaRPr lang="en-US" dirty="0"/>
           </a:p>
         </p:txBody>
       </p:sp>
@@ -1872,7 +1874,7 @@
               <a:rPr lang="en-US" smtClean="0"/>
               <a:t>‹#›</a:t>
             </a:fld>
-            <a:endParaRPr lang="en-US"/>
+            <a:endParaRPr lang="en-US" dirty="0"/>
           </a:p>
         </p:txBody>
       </p:sp>
@@ -1959,7 +1961,7 @@
               <a:rPr lang="en-US" smtClean="0"/>
               <a:t>3/11/20</a:t>
             </a:fld>
-            <a:endParaRPr lang="en-US"/>
+            <a:endParaRPr lang="en-US" dirty="0"/>
           </a:p>
         </p:txBody>
       </p:sp>
@@ -1984,7 +1986,7 @@
           <a:bodyPr/>
           <a:lstStyle/>
           <a:p>
-            <a:endParaRPr lang="en-US"/>
+            <a:endParaRPr lang="en-US" dirty="0"/>
           </a:p>
         </p:txBody>
       </p:sp>
@@ -2013,7 +2015,7 @@
               <a:rPr lang="en-US" smtClean="0"/>
               <a:t>‹#›</a:t>
             </a:fld>
-            <a:endParaRPr lang="en-US"/>
+            <a:endParaRPr lang="en-US" dirty="0"/>
           </a:p>
         </p:txBody>
       </p:sp>
@@ -2072,7 +2074,7 @@
               <a:rPr lang="en-US" smtClean="0"/>
               <a:t>3/11/20</a:t>
             </a:fld>
-            <a:endParaRPr lang="en-US"/>
+            <a:endParaRPr lang="en-US" dirty="0"/>
           </a:p>
         </p:txBody>
       </p:sp>
@@ -2097,7 +2099,7 @@
           <a:bodyPr/>
           <a:lstStyle/>
           <a:p>
-            <a:endParaRPr lang="en-US"/>
+            <a:endParaRPr lang="en-US" dirty="0"/>
           </a:p>
         </p:txBody>
       </p:sp>
@@ -2126,7 +2128,7 @@
               <a:rPr lang="en-US" smtClean="0"/>
               <a:t>‹#›</a:t>
             </a:fld>
-            <a:endParaRPr lang="en-US"/>
+            <a:endParaRPr lang="en-US" dirty="0"/>
           </a:p>
         </p:txBody>
       </p:sp>
@@ -2383,7 +2385,7 @@
               <a:rPr lang="en-US" smtClean="0"/>
               <a:t>3/11/20</a:t>
             </a:fld>
-            <a:endParaRPr lang="en-US"/>
+            <a:endParaRPr lang="en-US" dirty="0"/>
           </a:p>
         </p:txBody>
       </p:sp>
@@ -2408,7 +2410,7 @@
           <a:bodyPr/>
           <a:lstStyle/>
           <a:p>
-            <a:endParaRPr lang="en-US"/>
+            <a:endParaRPr lang="en-US" dirty="0"/>
           </a:p>
         </p:txBody>
       </p:sp>
@@ -2437,7 +2439,7 @@
               <a:rPr lang="en-US" smtClean="0"/>
               <a:t>‹#›</a:t>
             </a:fld>
-            <a:endParaRPr lang="en-US"/>
+            <a:endParaRPr lang="en-US" dirty="0"/>
           </a:p>
         </p:txBody>
       </p:sp>
@@ -2571,7 +2573,7 @@
             </a:lvl9pPr>
           </a:lstStyle>
           <a:p>
-            <a:endParaRPr lang="en-US"/>
+            <a:endParaRPr lang="en-US" dirty="0"/>
           </a:p>
         </p:txBody>
       </p:sp>
@@ -2671,7 +2673,7 @@
               <a:rPr lang="en-US" smtClean="0"/>
               <a:t>3/11/20</a:t>
             </a:fld>
-            <a:endParaRPr lang="en-US"/>
+            <a:endParaRPr lang="en-US" dirty="0"/>
           </a:p>
         </p:txBody>
       </p:sp>
@@ -2696,7 +2698,7 @@
           <a:bodyPr/>
           <a:lstStyle/>
           <a:p>
-            <a:endParaRPr lang="en-US"/>
+            <a:endParaRPr lang="en-US" dirty="0"/>
           </a:p>
         </p:txBody>
       </p:sp>
@@ -2725,7 +2727,7 @@
               <a:rPr lang="en-US" smtClean="0"/>
               <a:t>‹#›</a:t>
             </a:fld>
-            <a:endParaRPr lang="en-US"/>
+            <a:endParaRPr lang="en-US" dirty="0"/>
           </a:p>
         </p:txBody>
       </p:sp>
@@ -2912,7 +2914,7 @@
               <a:rPr lang="en-US" smtClean="0"/>
               <a:t>3/11/20</a:t>
             </a:fld>
-            <a:endParaRPr lang="en-US"/>
+            <a:endParaRPr lang="en-US" dirty="0"/>
           </a:p>
         </p:txBody>
       </p:sp>
@@ -2955,7 +2957,7 @@
             </a:lvl1pPr>
           </a:lstStyle>
           <a:p>
-            <a:endParaRPr lang="en-US"/>
+            <a:endParaRPr lang="en-US" dirty="0"/>
           </a:p>
         </p:txBody>
       </p:sp>
@@ -3002,7 +3004,7 @@
               <a:rPr lang="en-US" smtClean="0"/>
               <a:t>‹#›</a:t>
             </a:fld>
-            <a:endParaRPr lang="en-US"/>
+            <a:endParaRPr lang="en-US" dirty="0"/>
           </a:p>
         </p:txBody>
       </p:sp>
@@ -3587,7 +3589,7 @@
         </p:nvSpPr>
         <p:spPr>
           <a:xfrm>
-            <a:off x="3707674" y="2078491"/>
+            <a:off x="3716552" y="2078491"/>
             <a:ext cx="73152" cy="73152"/>
           </a:xfrm>
           <a:prstGeom prst="ellipse">
@@ -3615,7 +3617,7 @@
           <a:lstStyle/>
           <a:p>
             <a:pPr algn="ctr"/>
-            <a:endParaRPr lang="en-US"/>
+            <a:endParaRPr lang="en-US" dirty="0"/>
           </a:p>
         </p:txBody>
       </p:sp>
@@ -3633,7 +3635,7 @@
         </p:nvSpPr>
         <p:spPr>
           <a:xfrm>
-            <a:off x="3707672" y="4212279"/>
+            <a:off x="3716550" y="4212279"/>
             <a:ext cx="73152" cy="73152"/>
           </a:xfrm>
           <a:prstGeom prst="ellipse">
@@ -3661,7 +3663,7 @@
           <a:lstStyle/>
           <a:p>
             <a:pPr algn="ctr"/>
-            <a:endParaRPr lang="en-US"/>
+            <a:endParaRPr lang="en-US" dirty="0"/>
           </a:p>
         </p:txBody>
       </p:sp>
@@ -3679,7 +3681,7 @@
         </p:nvSpPr>
         <p:spPr>
           <a:xfrm>
-            <a:off x="1556950" y="3178575"/>
+            <a:off x="1574706" y="3178575"/>
             <a:ext cx="73152" cy="73152"/>
           </a:xfrm>
           <a:prstGeom prst="ellipse">
@@ -3707,7 +3709,7 @@
           <a:lstStyle/>
           <a:p>
             <a:pPr algn="ctr"/>
-            <a:endParaRPr lang="en-US"/>
+            <a:endParaRPr lang="en-US" dirty="0"/>
           </a:p>
         </p:txBody>
       </p:sp>
@@ -3855,12 +3857,126 @@
           </a:prstGeom>
         </p:spPr>
       </p:pic>
+      <p:sp>
+        <p:nvSpPr>
+          <p:cNvPr id="35" name="TextBox 34">
+            <a:extLst>
+              <a:ext uri="{FF2B5EF4-FFF2-40B4-BE49-F238E27FC236}">
+                <a16:creationId xmlns:a16="http://schemas.microsoft.com/office/drawing/2014/main" id="{EC45DFB9-CD90-CF4F-A545-51237D6AF5FF}"/>
+              </a:ext>
+            </a:extLst>
+          </p:cNvPr>
+          <p:cNvSpPr txBox="1"/>
+          <p:nvPr/>
+        </p:nvSpPr>
+        <p:spPr>
+          <a:xfrm rot="1620000">
+            <a:off x="1555171" y="3536626"/>
+            <a:ext cx="1180131" cy="261610"/>
+          </a:xfrm>
+          <a:prstGeom prst="rect">
+            <a:avLst/>
+          </a:prstGeom>
+          <a:noFill/>
+        </p:spPr>
+        <p:txBody>
+          <a:bodyPr wrap="none" rtlCol="0">
+            <a:spAutoFit/>
+          </a:bodyPr>
+          <a:lstStyle/>
+          <a:p>
+            <a:r>
+              <a:rPr lang="en-US" sz="1100" dirty="0">
+                <a:latin typeface="Times New Roman" panose="02020603050405020304" pitchFamily="18" charset="0"/>
+                <a:cs typeface="Times New Roman" panose="02020603050405020304" pitchFamily="18" charset="0"/>
+              </a:rPr>
+              <a:t>GMM Estimation</a:t>
+            </a:r>
+          </a:p>
+        </p:txBody>
+      </p:sp>
+      <p:sp>
+        <p:nvSpPr>
+          <p:cNvPr id="36" name="TextBox 35">
+            <a:extLst>
+              <a:ext uri="{FF2B5EF4-FFF2-40B4-BE49-F238E27FC236}">
+                <a16:creationId xmlns:a16="http://schemas.microsoft.com/office/drawing/2014/main" id="{7F81A1FF-1540-F74C-B577-3C12E85D3CCB}"/>
+              </a:ext>
+            </a:extLst>
+          </p:cNvPr>
+          <p:cNvSpPr txBox="1"/>
+          <p:nvPr/>
+        </p:nvSpPr>
+        <p:spPr>
+          <a:xfrm rot="1620000">
+            <a:off x="3874549" y="4609700"/>
+            <a:ext cx="1180131" cy="261610"/>
+          </a:xfrm>
+          <a:prstGeom prst="rect">
+            <a:avLst/>
+          </a:prstGeom>
+          <a:noFill/>
+        </p:spPr>
+        <p:txBody>
+          <a:bodyPr wrap="none" rtlCol="0">
+            <a:spAutoFit/>
+          </a:bodyPr>
+          <a:lstStyle/>
+          <a:p>
+            <a:r>
+              <a:rPr lang="en-US" sz="1100" dirty="0">
+                <a:latin typeface="Times New Roman" panose="02020603050405020304" pitchFamily="18" charset="0"/>
+                <a:cs typeface="Times New Roman" panose="02020603050405020304" pitchFamily="18" charset="0"/>
+              </a:rPr>
+              <a:t>GMM Estimation</a:t>
+            </a:r>
+          </a:p>
+        </p:txBody>
+      </p:sp>
+      <p:sp>
+        <p:nvSpPr>
+          <p:cNvPr id="37" name="TextBox 36">
+            <a:extLst>
+              <a:ext uri="{FF2B5EF4-FFF2-40B4-BE49-F238E27FC236}">
+                <a16:creationId xmlns:a16="http://schemas.microsoft.com/office/drawing/2014/main" id="{2A63D6F8-C00D-324F-943A-7C8B989998DC}"/>
+              </a:ext>
+            </a:extLst>
+          </p:cNvPr>
+          <p:cNvSpPr txBox="1"/>
+          <p:nvPr/>
+        </p:nvSpPr>
+        <p:spPr>
+          <a:xfrm rot="1620000">
+            <a:off x="3877056" y="2489439"/>
+            <a:ext cx="1180131" cy="261610"/>
+          </a:xfrm>
+          <a:prstGeom prst="rect">
+            <a:avLst/>
+          </a:prstGeom>
+          <a:noFill/>
+        </p:spPr>
+        <p:txBody>
+          <a:bodyPr wrap="none" rtlCol="0">
+            <a:spAutoFit/>
+          </a:bodyPr>
+          <a:lstStyle/>
+          <a:p>
+            <a:r>
+              <a:rPr lang="en-US" sz="1100" dirty="0">
+                <a:latin typeface="Times New Roman" panose="02020603050405020304" pitchFamily="18" charset="0"/>
+                <a:cs typeface="Times New Roman" panose="02020603050405020304" pitchFamily="18" charset="0"/>
+              </a:rPr>
+              <a:t>GMM Estimation</a:t>
+            </a:r>
+          </a:p>
+        </p:txBody>
+      </p:sp>
       <p:pic>
         <p:nvPicPr>
-          <p:cNvPr id="25" name="Picture 24">
-            <a:extLst>
-              <a:ext uri="{FF2B5EF4-FFF2-40B4-BE49-F238E27FC236}">
-                <a16:creationId xmlns:a16="http://schemas.microsoft.com/office/drawing/2014/main" id="{965B127F-2CBF-7C44-B7DA-39E199E9DEE5}"/>
+          <p:cNvPr id="41" name="Picture 40">
+            <a:extLst>
+              <a:ext uri="{FF2B5EF4-FFF2-40B4-BE49-F238E27FC236}">
+                <a16:creationId xmlns:a16="http://schemas.microsoft.com/office/drawing/2014/main" id="{E73044E2-649F-6C4D-ADC1-CBB139D3862A}"/>
               </a:ext>
             </a:extLst>
           </p:cNvPr>
@@ -3877,134 +3993,20 @@
         </p:blipFill>
         <p:spPr>
           <a:xfrm>
-            <a:off x="3145536" y="3968755"/>
-            <a:ext cx="548640" cy="274320"/>
+            <a:off x="5285232" y="2723022"/>
+            <a:ext cx="295849" cy="329184"/>
           </a:xfrm>
           <a:prstGeom prst="rect">
             <a:avLst/>
           </a:prstGeom>
         </p:spPr>
       </p:pic>
-      <p:sp>
-        <p:nvSpPr>
-          <p:cNvPr id="35" name="TextBox 34">
-            <a:extLst>
-              <a:ext uri="{FF2B5EF4-FFF2-40B4-BE49-F238E27FC236}">
-                <a16:creationId xmlns:a16="http://schemas.microsoft.com/office/drawing/2014/main" id="{EC45DFB9-CD90-CF4F-A545-51237D6AF5FF}"/>
-              </a:ext>
-            </a:extLst>
-          </p:cNvPr>
-          <p:cNvSpPr txBox="1"/>
-          <p:nvPr/>
-        </p:nvSpPr>
-        <p:spPr>
-          <a:xfrm rot="1620000">
-            <a:off x="1555171" y="3536626"/>
-            <a:ext cx="1180131" cy="261610"/>
-          </a:xfrm>
-          <a:prstGeom prst="rect">
-            <a:avLst/>
-          </a:prstGeom>
-          <a:noFill/>
-        </p:spPr>
-        <p:txBody>
-          <a:bodyPr wrap="none" rtlCol="0">
-            <a:spAutoFit/>
-          </a:bodyPr>
-          <a:lstStyle/>
-          <a:p>
-            <a:r>
-              <a:rPr lang="en-US" sz="1100" dirty="0">
-                <a:latin typeface="Times New Roman" panose="02020603050405020304" pitchFamily="18" charset="0"/>
-                <a:cs typeface="Times New Roman" panose="02020603050405020304" pitchFamily="18" charset="0"/>
-              </a:rPr>
-              <a:t>GMM Estimation</a:t>
-            </a:r>
-          </a:p>
-        </p:txBody>
-      </p:sp>
-      <p:sp>
-        <p:nvSpPr>
-          <p:cNvPr id="36" name="TextBox 35">
-            <a:extLst>
-              <a:ext uri="{FF2B5EF4-FFF2-40B4-BE49-F238E27FC236}">
-                <a16:creationId xmlns:a16="http://schemas.microsoft.com/office/drawing/2014/main" id="{7F81A1FF-1540-F74C-B577-3C12E85D3CCB}"/>
-              </a:ext>
-            </a:extLst>
-          </p:cNvPr>
-          <p:cNvSpPr txBox="1"/>
-          <p:nvPr/>
-        </p:nvSpPr>
-        <p:spPr>
-          <a:xfrm rot="1620000">
-            <a:off x="3874549" y="4609700"/>
-            <a:ext cx="1180131" cy="261610"/>
-          </a:xfrm>
-          <a:prstGeom prst="rect">
-            <a:avLst/>
-          </a:prstGeom>
-          <a:noFill/>
-        </p:spPr>
-        <p:txBody>
-          <a:bodyPr wrap="none" rtlCol="0">
-            <a:spAutoFit/>
-          </a:bodyPr>
-          <a:lstStyle/>
-          <a:p>
-            <a:r>
-              <a:rPr lang="en-US" sz="1100" dirty="0">
-                <a:latin typeface="Times New Roman" panose="02020603050405020304" pitchFamily="18" charset="0"/>
-                <a:cs typeface="Times New Roman" panose="02020603050405020304" pitchFamily="18" charset="0"/>
-              </a:rPr>
-              <a:t>GMM Estimation</a:t>
-            </a:r>
-          </a:p>
-        </p:txBody>
-      </p:sp>
-      <p:sp>
-        <p:nvSpPr>
-          <p:cNvPr id="37" name="TextBox 36">
-            <a:extLst>
-              <a:ext uri="{FF2B5EF4-FFF2-40B4-BE49-F238E27FC236}">
-                <a16:creationId xmlns:a16="http://schemas.microsoft.com/office/drawing/2014/main" id="{2A63D6F8-C00D-324F-943A-7C8B989998DC}"/>
-              </a:ext>
-            </a:extLst>
-          </p:cNvPr>
-          <p:cNvSpPr txBox="1"/>
-          <p:nvPr/>
-        </p:nvSpPr>
-        <p:spPr>
-          <a:xfrm rot="1620000">
-            <a:off x="3877056" y="2489439"/>
-            <a:ext cx="1180131" cy="261610"/>
-          </a:xfrm>
-          <a:prstGeom prst="rect">
-            <a:avLst/>
-          </a:prstGeom>
-          <a:noFill/>
-        </p:spPr>
-        <p:txBody>
-          <a:bodyPr wrap="none" rtlCol="0">
-            <a:spAutoFit/>
-          </a:bodyPr>
-          <a:lstStyle/>
-          <a:p>
-            <a:r>
-              <a:rPr lang="en-US" sz="1100" dirty="0">
-                <a:latin typeface="Times New Roman" panose="02020603050405020304" pitchFamily="18" charset="0"/>
-                <a:cs typeface="Times New Roman" panose="02020603050405020304" pitchFamily="18" charset="0"/>
-              </a:rPr>
-              <a:t>GMM Estimation</a:t>
-            </a:r>
-          </a:p>
-        </p:txBody>
-      </p:sp>
       <p:pic>
         <p:nvPicPr>
-          <p:cNvPr id="41" name="Picture 40">
-            <a:extLst>
-              <a:ext uri="{FF2B5EF4-FFF2-40B4-BE49-F238E27FC236}">
-                <a16:creationId xmlns:a16="http://schemas.microsoft.com/office/drawing/2014/main" id="{E73044E2-649F-6C4D-ADC1-CBB139D3862A}"/>
+          <p:cNvPr id="45" name="Picture 44">
+            <a:extLst>
+              <a:ext uri="{FF2B5EF4-FFF2-40B4-BE49-F238E27FC236}">
+                <a16:creationId xmlns:a16="http://schemas.microsoft.com/office/drawing/2014/main" id="{94925D4E-BC98-F544-9A44-A1245B26069D}"/>
               </a:ext>
             </a:extLst>
           </p:cNvPr>
@@ -4021,8 +4023,8 @@
         </p:blipFill>
         <p:spPr>
           <a:xfrm>
-            <a:off x="5285232" y="2723022"/>
-            <a:ext cx="295849" cy="329184"/>
+            <a:off x="5288853" y="4837357"/>
+            <a:ext cx="341845" cy="329184"/>
           </a:xfrm>
           <a:prstGeom prst="rect">
             <a:avLst/>
@@ -4031,10 +4033,10 @@
       </p:pic>
       <p:pic>
         <p:nvPicPr>
-          <p:cNvPr id="45" name="Picture 44">
-            <a:extLst>
-              <a:ext uri="{FF2B5EF4-FFF2-40B4-BE49-F238E27FC236}">
-                <a16:creationId xmlns:a16="http://schemas.microsoft.com/office/drawing/2014/main" id="{94925D4E-BC98-F544-9A44-A1245B26069D}"/>
+          <p:cNvPr id="49" name="Picture 48">
+            <a:extLst>
+              <a:ext uri="{FF2B5EF4-FFF2-40B4-BE49-F238E27FC236}">
+                <a16:creationId xmlns:a16="http://schemas.microsoft.com/office/drawing/2014/main" id="{8003A240-E11D-F24E-BD42-C0A659975273}"/>
               </a:ext>
             </a:extLst>
           </p:cNvPr>
@@ -4051,8 +4053,8 @@
         </p:blipFill>
         <p:spPr>
           <a:xfrm>
-            <a:off x="5288853" y="4837357"/>
-            <a:ext cx="341845" cy="329184"/>
+            <a:off x="5285232" y="1233170"/>
+            <a:ext cx="313508" cy="219456"/>
           </a:xfrm>
           <a:prstGeom prst="rect">
             <a:avLst/>
@@ -4061,10 +4063,76 @@
       </p:pic>
       <p:pic>
         <p:nvPicPr>
-          <p:cNvPr id="49" name="Picture 48">
-            <a:extLst>
-              <a:ext uri="{FF2B5EF4-FFF2-40B4-BE49-F238E27FC236}">
-                <a16:creationId xmlns:a16="http://schemas.microsoft.com/office/drawing/2014/main" id="{8003A240-E11D-F24E-BD42-C0A659975273}"/>
+          <p:cNvPr id="52" name="Picture 51">
+            <a:extLst>
+              <a:ext uri="{FF2B5EF4-FFF2-40B4-BE49-F238E27FC236}">
+                <a16:creationId xmlns:a16="http://schemas.microsoft.com/office/drawing/2014/main" id="{5F100FBA-AF12-9D40-90EE-3FE8F8D166CE}"/>
+              </a:ext>
+            </a:extLst>
+          </p:cNvPr>
+          <p:cNvPicPr>
+            <a:picLocks noChangeAspect="1"/>
+          </p:cNvPicPr>
+          <p:nvPr/>
+        </p:nvPicPr>
+        <p:blipFill>
+          <a:blip r:embed="rId5"/>
+          <a:stretch>
+            <a:fillRect/>
+          </a:stretch>
+        </p:blipFill>
+        <p:spPr>
+          <a:xfrm>
+            <a:off x="5285232" y="3365531"/>
+            <a:ext cx="313508" cy="219456"/>
+          </a:xfrm>
+          <a:prstGeom prst="rect">
+            <a:avLst/>
+          </a:prstGeom>
+        </p:spPr>
+      </p:pic>
+      <p:cxnSp>
+        <p:nvCxnSpPr>
+          <p:cNvPr id="24" name="Straight Connector 23">
+            <a:extLst>
+              <a:ext uri="{FF2B5EF4-FFF2-40B4-BE49-F238E27FC236}">
+                <a16:creationId xmlns:a16="http://schemas.microsoft.com/office/drawing/2014/main" id="{97CF952D-50F0-F147-98BA-8CD2E29D924B}"/>
+              </a:ext>
+            </a:extLst>
+          </p:cNvPr>
+          <p:cNvCxnSpPr/>
+          <p:nvPr/>
+        </p:nvCxnSpPr>
+        <p:spPr>
+          <a:xfrm>
+            <a:off x="7190509" y="0"/>
+            <a:ext cx="0" cy="6553200"/>
+          </a:xfrm>
+          <a:prstGeom prst="line">
+            <a:avLst/>
+          </a:prstGeom>
+        </p:spPr>
+        <p:style>
+          <a:lnRef idx="1">
+            <a:schemeClr val="accent1"/>
+          </a:lnRef>
+          <a:fillRef idx="0">
+            <a:schemeClr val="accent1"/>
+          </a:fillRef>
+          <a:effectRef idx="0">
+            <a:schemeClr val="accent1"/>
+          </a:effectRef>
+          <a:fontRef idx="minor">
+            <a:schemeClr val="tx1"/>
+          </a:fontRef>
+        </p:style>
+      </p:cxnSp>
+      <p:pic>
+        <p:nvPicPr>
+          <p:cNvPr id="3" name="Picture 2">
+            <a:extLst>
+              <a:ext uri="{FF2B5EF4-FFF2-40B4-BE49-F238E27FC236}">
+                <a16:creationId xmlns:a16="http://schemas.microsoft.com/office/drawing/2014/main" id="{AC281C76-AB9D-814F-BFB1-AE8A1D8B89D0}"/>
               </a:ext>
             </a:extLst>
           </p:cNvPr>
@@ -4081,42 +4149,15 @@
         </p:blipFill>
         <p:spPr>
           <a:xfrm>
-            <a:off x="5285232" y="1233170"/>
-            <a:ext cx="313508" cy="219456"/>
+            <a:off x="3145536" y="3968496"/>
+            <a:ext cx="530354" cy="246888"/>
           </a:xfrm>
           <a:prstGeom prst="rect">
             <a:avLst/>
           </a:prstGeom>
-        </p:spPr>
-      </p:pic>
-      <p:pic>
-        <p:nvPicPr>
-          <p:cNvPr id="52" name="Picture 51">
-            <a:extLst>
-              <a:ext uri="{FF2B5EF4-FFF2-40B4-BE49-F238E27FC236}">
-                <a16:creationId xmlns:a16="http://schemas.microsoft.com/office/drawing/2014/main" id="{5F100FBA-AF12-9D40-90EE-3FE8F8D166CE}"/>
-              </a:ext>
-            </a:extLst>
-          </p:cNvPr>
-          <p:cNvPicPr>
-            <a:picLocks noChangeAspect="1"/>
-          </p:cNvPicPr>
-          <p:nvPr/>
-        </p:nvPicPr>
-        <p:blipFill>
-          <a:blip r:embed="rId6"/>
-          <a:stretch>
-            <a:fillRect/>
-          </a:stretch>
-        </p:blipFill>
-        <p:spPr>
-          <a:xfrm>
-            <a:off x="5285232" y="3365531"/>
-            <a:ext cx="313508" cy="219456"/>
-          </a:xfrm>
-          <a:prstGeom prst="rect">
-            <a:avLst/>
-          </a:prstGeom>
+          <a:ln>
+            <a:noFill/>
+          </a:ln>
         </p:spPr>
       </p:pic>
     </p:spTree>
@@ -4170,7 +4211,7 @@
         </p:blipFill>
         <p:spPr>
           <a:xfrm>
-            <a:off x="212277" y="3655081"/>
+            <a:off x="239987" y="3655081"/>
             <a:ext cx="11825015" cy="3090672"/>
           </a:xfrm>
           <a:prstGeom prst="rect">
@@ -4236,20 +4277,12 @@
           <a:lstStyle/>
           <a:p>
             <a:r>
-              <a:rPr lang="en-US" sz="1950" dirty="0" err="1">
-                <a:solidFill>
-                  <a:srgbClr val="262626"/>
-                </a:solidFill>
-              </a:rPr>
-              <a:t>Scen</a:t>
-            </a:r>
-            <a:r>
               <a:rPr lang="en-US" sz="1950" dirty="0">
                 <a:solidFill>
                   <a:srgbClr val="262626"/>
                 </a:solidFill>
               </a:rPr>
-              <a:t>. 1: EKNR values</a:t>
+              <a:t>Scen. 1: EKNR values</a:t>
             </a:r>
           </a:p>
           <a:p>
@@ -4290,20 +4323,12 @@
           <a:lstStyle/>
           <a:p>
             <a:r>
-              <a:rPr lang="en-US" sz="1950" dirty="0" err="1">
-                <a:solidFill>
-                  <a:srgbClr val="262626"/>
-                </a:solidFill>
-              </a:rPr>
-              <a:t>Scen</a:t>
-            </a:r>
-            <a:r>
               <a:rPr lang="en-US" sz="1950" dirty="0">
                 <a:solidFill>
                   <a:srgbClr val="262626"/>
                 </a:solidFill>
               </a:rPr>
-              <a:t>. 1: EKNR values</a:t>
+              <a:t>Scen. 1: EKNR values</a:t>
             </a:r>
           </a:p>
           <a:p>
@@ -4344,20 +4369,12 @@
           <a:lstStyle/>
           <a:p>
             <a:r>
-              <a:rPr lang="en-US" sz="1950" dirty="0" err="1">
-                <a:solidFill>
-                  <a:srgbClr val="262626"/>
-                </a:solidFill>
-              </a:rPr>
-              <a:t>Scen</a:t>
-            </a:r>
-            <a:r>
               <a:rPr lang="en-US" sz="1950" dirty="0">
                 <a:solidFill>
                   <a:srgbClr val="262626"/>
                 </a:solidFill>
               </a:rPr>
-              <a:t>. 4: GMM values</a:t>
+              <a:t>Scen. 4: GMM values</a:t>
             </a:r>
           </a:p>
           <a:p>
@@ -4369,10 +4386,600 @@
           </a:p>
         </p:txBody>
       </p:sp>
+      <p:sp>
+        <p:nvSpPr>
+          <p:cNvPr id="16" name="TextBox 15">
+            <a:extLst>
+              <a:ext uri="{FF2B5EF4-FFF2-40B4-BE49-F238E27FC236}">
+                <a16:creationId xmlns:a16="http://schemas.microsoft.com/office/drawing/2014/main" id="{5D1B2A33-BAA7-E645-8398-68C1840E0FD5}"/>
+              </a:ext>
+            </a:extLst>
+          </p:cNvPr>
+          <p:cNvSpPr txBox="1"/>
+          <p:nvPr/>
+        </p:nvSpPr>
+        <p:spPr>
+          <a:xfrm rot="16200000">
+            <a:off x="-837154" y="4579888"/>
+            <a:ext cx="2505353" cy="692497"/>
+          </a:xfrm>
+          <a:prstGeom prst="rect">
+            <a:avLst/>
+          </a:prstGeom>
+          <a:noFill/>
+        </p:spPr>
+        <p:txBody>
+          <a:bodyPr wrap="square" rtlCol="0">
+            <a:spAutoFit/>
+          </a:bodyPr>
+          <a:lstStyle/>
+          <a:p>
+            <a:r>
+              <a:rPr lang="en-US" sz="1950" dirty="0">
+                <a:solidFill>
+                  <a:srgbClr val="262626"/>
+                </a:solidFill>
+              </a:rPr>
+              <a:t>Scen. 4: GMM values</a:t>
+            </a:r>
+          </a:p>
+          <a:p>
+            <a:endParaRPr lang="en-US" sz="1950" dirty="0">
+              <a:solidFill>
+                <a:srgbClr val="262626"/>
+              </a:solidFill>
+            </a:endParaRPr>
+          </a:p>
+        </p:txBody>
+      </p:sp>
     </p:spTree>
     <p:extLst>
       <p:ext uri="{BB962C8B-B14F-4D97-AF65-F5344CB8AC3E}">
         <p14:creationId xmlns:p14="http://schemas.microsoft.com/office/powerpoint/2010/main" val="3875709553"/>
+      </p:ext>
+    </p:extLst>
+  </p:cSld>
+  <p:clrMapOvr>
+    <a:masterClrMapping/>
+  </p:clrMapOvr>
+</p:sld>
+</file>
+
+<file path=ppt/slides/slide3.xml><?xml version="1.0" encoding="utf-8"?>
+<p:sld xmlns:a="http://schemas.openxmlformats.org/drawingml/2006/main" xmlns:r="http://schemas.openxmlformats.org/officeDocument/2006/relationships" xmlns:p="http://schemas.openxmlformats.org/presentationml/2006/main">
+  <p:cSld>
+    <p:spTree>
+      <p:nvGrpSpPr>
+        <p:cNvPr id="1" name=""/>
+        <p:cNvGrpSpPr/>
+        <p:nvPr/>
+      </p:nvGrpSpPr>
+      <p:grpSpPr>
+        <a:xfrm>
+          <a:off x="0" y="0"/>
+          <a:ext cx="0" cy="0"/>
+          <a:chOff x="0" y="0"/>
+          <a:chExt cx="0" cy="0"/>
+        </a:xfrm>
+      </p:grpSpPr>
+      <p:pic>
+        <p:nvPicPr>
+          <p:cNvPr id="6" name="Picture 5">
+            <a:extLst>
+              <a:ext uri="{FF2B5EF4-FFF2-40B4-BE49-F238E27FC236}">
+                <a16:creationId xmlns:a16="http://schemas.microsoft.com/office/drawing/2014/main" id="{10EF8B8A-FDD5-AB4B-BD1D-FC036CF7590D}"/>
+              </a:ext>
+            </a:extLst>
+          </p:cNvPr>
+          <p:cNvPicPr>
+            <a:picLocks/>
+          </p:cNvPicPr>
+          <p:nvPr/>
+        </p:nvPicPr>
+        <p:blipFill rotWithShape="1">
+          <a:blip r:embed="rId2"/>
+          <a:srcRect t="53940"/>
+          <a:stretch/>
+        </p:blipFill>
+        <p:spPr>
+          <a:xfrm>
+            <a:off x="359709" y="3579473"/>
+            <a:ext cx="11751830" cy="3108960"/>
+          </a:xfrm>
+          <a:prstGeom prst="rect">
+            <a:avLst/>
+          </a:prstGeom>
+        </p:spPr>
+      </p:pic>
+      <p:sp>
+        <p:nvSpPr>
+          <p:cNvPr id="7" name="TextBox 6">
+            <a:extLst>
+              <a:ext uri="{FF2B5EF4-FFF2-40B4-BE49-F238E27FC236}">
+                <a16:creationId xmlns:a16="http://schemas.microsoft.com/office/drawing/2014/main" id="{9E56C272-63BB-3240-A618-567097056B32}"/>
+              </a:ext>
+            </a:extLst>
+          </p:cNvPr>
+          <p:cNvSpPr txBox="1"/>
+          <p:nvPr/>
+        </p:nvSpPr>
+        <p:spPr>
+          <a:xfrm rot="16200000">
+            <a:off x="5381661" y="4579888"/>
+            <a:ext cx="2505353" cy="692497"/>
+          </a:xfrm>
+          <a:prstGeom prst="rect">
+            <a:avLst/>
+          </a:prstGeom>
+          <a:noFill/>
+        </p:spPr>
+        <p:txBody>
+          <a:bodyPr wrap="square" rtlCol="0">
+            <a:spAutoFit/>
+          </a:bodyPr>
+          <a:lstStyle/>
+          <a:p>
+            <a:r>
+              <a:rPr lang="en-US" sz="1950" dirty="0">
+                <a:solidFill>
+                  <a:srgbClr val="262626"/>
+                </a:solidFill>
+              </a:rPr>
+              <a:t>Scen. 4: GMM values</a:t>
+            </a:r>
+          </a:p>
+          <a:p>
+            <a:endParaRPr lang="en-US" sz="1950" dirty="0">
+              <a:solidFill>
+                <a:srgbClr val="262626"/>
+              </a:solidFill>
+            </a:endParaRPr>
+          </a:p>
+        </p:txBody>
+      </p:sp>
+      <p:sp>
+        <p:nvSpPr>
+          <p:cNvPr id="8" name="TextBox 7">
+            <a:extLst>
+              <a:ext uri="{FF2B5EF4-FFF2-40B4-BE49-F238E27FC236}">
+                <a16:creationId xmlns:a16="http://schemas.microsoft.com/office/drawing/2014/main" id="{F5A83A75-CBC7-DF45-A0DE-447F2B6CCEED}"/>
+              </a:ext>
+            </a:extLst>
+          </p:cNvPr>
+          <p:cNvSpPr txBox="1"/>
+          <p:nvPr/>
+        </p:nvSpPr>
+        <p:spPr>
+          <a:xfrm rot="16200000">
+            <a:off x="-754024" y="4524468"/>
+            <a:ext cx="2505353" cy="692497"/>
+          </a:xfrm>
+          <a:prstGeom prst="rect">
+            <a:avLst/>
+          </a:prstGeom>
+          <a:noFill/>
+        </p:spPr>
+        <p:txBody>
+          <a:bodyPr wrap="square" rtlCol="0">
+            <a:spAutoFit/>
+          </a:bodyPr>
+          <a:lstStyle/>
+          <a:p>
+            <a:r>
+              <a:rPr lang="en-US" sz="1950" dirty="0">
+                <a:solidFill>
+                  <a:srgbClr val="262626"/>
+                </a:solidFill>
+              </a:rPr>
+              <a:t>Scen. 4: GMM values</a:t>
+            </a:r>
+          </a:p>
+          <a:p>
+            <a:endParaRPr lang="en-US" sz="1950" dirty="0">
+              <a:solidFill>
+                <a:srgbClr val="262626"/>
+              </a:solidFill>
+            </a:endParaRPr>
+          </a:p>
+        </p:txBody>
+      </p:sp>
+      <p:pic>
+        <p:nvPicPr>
+          <p:cNvPr id="10" name="Picture 9">
+            <a:extLst>
+              <a:ext uri="{FF2B5EF4-FFF2-40B4-BE49-F238E27FC236}">
+                <a16:creationId xmlns:a16="http://schemas.microsoft.com/office/drawing/2014/main" id="{437D82C4-8803-7F49-AD03-B1A498220BD9}"/>
+              </a:ext>
+            </a:extLst>
+          </p:cNvPr>
+          <p:cNvPicPr>
+            <a:picLocks/>
+          </p:cNvPicPr>
+          <p:nvPr/>
+        </p:nvPicPr>
+        <p:blipFill rotWithShape="1">
+          <a:blip r:embed="rId3"/>
+          <a:srcRect t="50707"/>
+          <a:stretch/>
+        </p:blipFill>
+        <p:spPr>
+          <a:xfrm>
+            <a:off x="359709" y="-83142"/>
+            <a:ext cx="11624476" cy="3436360"/>
+          </a:xfrm>
+          <a:prstGeom prst="rect">
+            <a:avLst/>
+          </a:prstGeom>
+        </p:spPr>
+      </p:pic>
+      <p:sp>
+        <p:nvSpPr>
+          <p:cNvPr id="11" name="TextBox 10">
+            <a:extLst>
+              <a:ext uri="{FF2B5EF4-FFF2-40B4-BE49-F238E27FC236}">
+                <a16:creationId xmlns:a16="http://schemas.microsoft.com/office/drawing/2014/main" id="{CDC5E616-2AF6-0B4C-9157-32A62C24E02B}"/>
+              </a:ext>
+            </a:extLst>
+          </p:cNvPr>
+          <p:cNvSpPr txBox="1"/>
+          <p:nvPr/>
+        </p:nvSpPr>
+        <p:spPr>
+          <a:xfrm rot="16200000">
+            <a:off x="5342604" y="1091097"/>
+            <a:ext cx="2505353" cy="692497"/>
+          </a:xfrm>
+          <a:prstGeom prst="rect">
+            <a:avLst/>
+          </a:prstGeom>
+          <a:noFill/>
+        </p:spPr>
+        <p:txBody>
+          <a:bodyPr wrap="square" rtlCol="0">
+            <a:spAutoFit/>
+          </a:bodyPr>
+          <a:lstStyle/>
+          <a:p>
+            <a:r>
+              <a:rPr lang="en-US" sz="1950" dirty="0">
+                <a:solidFill>
+                  <a:srgbClr val="262626"/>
+                </a:solidFill>
+              </a:rPr>
+              <a:t>Scen. 1: EKNR values</a:t>
+            </a:r>
+          </a:p>
+          <a:p>
+            <a:endParaRPr lang="en-US" sz="1950" dirty="0">
+              <a:solidFill>
+                <a:srgbClr val="262626"/>
+              </a:solidFill>
+            </a:endParaRPr>
+          </a:p>
+        </p:txBody>
+      </p:sp>
+      <p:sp>
+        <p:nvSpPr>
+          <p:cNvPr id="12" name="TextBox 11">
+            <a:extLst>
+              <a:ext uri="{FF2B5EF4-FFF2-40B4-BE49-F238E27FC236}">
+                <a16:creationId xmlns:a16="http://schemas.microsoft.com/office/drawing/2014/main" id="{FE8B2B47-889F-444C-B91E-71CD895142ED}"/>
+              </a:ext>
+            </a:extLst>
+          </p:cNvPr>
+          <p:cNvSpPr txBox="1"/>
+          <p:nvPr/>
+        </p:nvSpPr>
+        <p:spPr>
+          <a:xfrm rot="16200000">
+            <a:off x="-726313" y="1090664"/>
+            <a:ext cx="2505353" cy="692497"/>
+          </a:xfrm>
+          <a:prstGeom prst="rect">
+            <a:avLst/>
+          </a:prstGeom>
+          <a:noFill/>
+        </p:spPr>
+        <p:txBody>
+          <a:bodyPr wrap="square" rtlCol="0">
+            <a:spAutoFit/>
+          </a:bodyPr>
+          <a:lstStyle/>
+          <a:p>
+            <a:r>
+              <a:rPr lang="en-US" sz="1950" dirty="0">
+                <a:solidFill>
+                  <a:srgbClr val="262626"/>
+                </a:solidFill>
+              </a:rPr>
+              <a:t>Scen. 1: EKNR values</a:t>
+            </a:r>
+          </a:p>
+          <a:p>
+            <a:endParaRPr lang="en-US" sz="1950" dirty="0">
+              <a:solidFill>
+                <a:srgbClr val="262626"/>
+              </a:solidFill>
+            </a:endParaRPr>
+          </a:p>
+        </p:txBody>
+      </p:sp>
+    </p:spTree>
+    <p:extLst>
+      <p:ext uri="{BB962C8B-B14F-4D97-AF65-F5344CB8AC3E}">
+        <p14:creationId xmlns:p14="http://schemas.microsoft.com/office/powerpoint/2010/main" val="1189715900"/>
+      </p:ext>
+    </p:extLst>
+  </p:cSld>
+  <p:clrMapOvr>
+    <a:masterClrMapping/>
+  </p:clrMapOvr>
+</p:sld>
+</file>
+
+<file path=ppt/slides/slide4.xml><?xml version="1.0" encoding="utf-8"?>
+<p:sld xmlns:a="http://schemas.openxmlformats.org/drawingml/2006/main" xmlns:r="http://schemas.openxmlformats.org/officeDocument/2006/relationships" xmlns:p="http://schemas.openxmlformats.org/presentationml/2006/main">
+  <p:cSld>
+    <p:spTree>
+      <p:nvGrpSpPr>
+        <p:cNvPr id="1" name=""/>
+        <p:cNvGrpSpPr/>
+        <p:nvPr/>
+      </p:nvGrpSpPr>
+      <p:grpSpPr>
+        <a:xfrm>
+          <a:off x="0" y="0"/>
+          <a:ext cx="0" cy="0"/>
+          <a:chOff x="0" y="0"/>
+          <a:chExt cx="0" cy="0"/>
+        </a:xfrm>
+      </p:grpSpPr>
+      <p:pic>
+        <p:nvPicPr>
+          <p:cNvPr id="6" name="Picture 5">
+            <a:extLst>
+              <a:ext uri="{FF2B5EF4-FFF2-40B4-BE49-F238E27FC236}">
+                <a16:creationId xmlns:a16="http://schemas.microsoft.com/office/drawing/2014/main" id="{10786F79-40B2-5343-BDFC-7C9F7BAE4386}"/>
+              </a:ext>
+            </a:extLst>
+          </p:cNvPr>
+          <p:cNvPicPr>
+            <a:picLocks noChangeAspect="1"/>
+          </p:cNvPicPr>
+          <p:nvPr/>
+        </p:nvPicPr>
+        <p:blipFill rotWithShape="1">
+          <a:blip r:embed="rId2"/>
+          <a:srcRect t="53958"/>
+          <a:stretch/>
+        </p:blipFill>
+        <p:spPr>
+          <a:xfrm>
+            <a:off x="365185" y="3633305"/>
+            <a:ext cx="11617199" cy="3081528"/>
+          </a:xfrm>
+          <a:prstGeom prst="rect">
+            <a:avLst/>
+          </a:prstGeom>
+        </p:spPr>
+      </p:pic>
+      <p:sp>
+        <p:nvSpPr>
+          <p:cNvPr id="7" name="TextBox 6">
+            <a:extLst>
+              <a:ext uri="{FF2B5EF4-FFF2-40B4-BE49-F238E27FC236}">
+                <a16:creationId xmlns:a16="http://schemas.microsoft.com/office/drawing/2014/main" id="{8FFD4888-E7D3-034E-83BE-CD081E54F076}"/>
+              </a:ext>
+            </a:extLst>
+          </p:cNvPr>
+          <p:cNvSpPr txBox="1"/>
+          <p:nvPr/>
+        </p:nvSpPr>
+        <p:spPr>
+          <a:xfrm rot="16200000">
+            <a:off x="5381661" y="4579888"/>
+            <a:ext cx="2505353" cy="692497"/>
+          </a:xfrm>
+          <a:prstGeom prst="rect">
+            <a:avLst/>
+          </a:prstGeom>
+          <a:noFill/>
+        </p:spPr>
+        <p:txBody>
+          <a:bodyPr wrap="square" rtlCol="0">
+            <a:spAutoFit/>
+          </a:bodyPr>
+          <a:lstStyle/>
+          <a:p>
+            <a:r>
+              <a:rPr lang="en-US" sz="1950" dirty="0">
+                <a:solidFill>
+                  <a:srgbClr val="262626"/>
+                </a:solidFill>
+              </a:rPr>
+              <a:t>Scen. 4: GMM values</a:t>
+            </a:r>
+          </a:p>
+          <a:p>
+            <a:endParaRPr lang="en-US" sz="1950" dirty="0">
+              <a:solidFill>
+                <a:srgbClr val="262626"/>
+              </a:solidFill>
+            </a:endParaRPr>
+          </a:p>
+        </p:txBody>
+      </p:sp>
+      <p:sp>
+        <p:nvSpPr>
+          <p:cNvPr id="8" name="TextBox 7">
+            <a:extLst>
+              <a:ext uri="{FF2B5EF4-FFF2-40B4-BE49-F238E27FC236}">
+                <a16:creationId xmlns:a16="http://schemas.microsoft.com/office/drawing/2014/main" id="{81D9A68B-AF3A-0445-95A7-76FD8BAE8257}"/>
+              </a:ext>
+            </a:extLst>
+          </p:cNvPr>
+          <p:cNvSpPr txBox="1"/>
+          <p:nvPr/>
+        </p:nvSpPr>
+        <p:spPr>
+          <a:xfrm rot="16200000">
+            <a:off x="-796888" y="4524468"/>
+            <a:ext cx="2505353" cy="692497"/>
+          </a:xfrm>
+          <a:prstGeom prst="rect">
+            <a:avLst/>
+          </a:prstGeom>
+          <a:noFill/>
+        </p:spPr>
+        <p:txBody>
+          <a:bodyPr wrap="square" rtlCol="0">
+            <a:spAutoFit/>
+          </a:bodyPr>
+          <a:lstStyle/>
+          <a:p>
+            <a:r>
+              <a:rPr lang="en-US" sz="1950" dirty="0">
+                <a:solidFill>
+                  <a:srgbClr val="262626"/>
+                </a:solidFill>
+              </a:rPr>
+              <a:t>Scen. 4: GMM values</a:t>
+            </a:r>
+          </a:p>
+          <a:p>
+            <a:endParaRPr lang="en-US" sz="1950" dirty="0">
+              <a:solidFill>
+                <a:srgbClr val="262626"/>
+              </a:solidFill>
+            </a:endParaRPr>
+          </a:p>
+        </p:txBody>
+      </p:sp>
+      <p:pic>
+        <p:nvPicPr>
+          <p:cNvPr id="10" name="Picture 9">
+            <a:extLst>
+              <a:ext uri="{FF2B5EF4-FFF2-40B4-BE49-F238E27FC236}">
+                <a16:creationId xmlns:a16="http://schemas.microsoft.com/office/drawing/2014/main" id="{732F530E-05FB-E949-8F50-4FF80FB5DC0A}"/>
+              </a:ext>
+            </a:extLst>
+          </p:cNvPr>
+          <p:cNvPicPr>
+            <a:picLocks/>
+          </p:cNvPicPr>
+          <p:nvPr/>
+        </p:nvPicPr>
+        <p:blipFill rotWithShape="1">
+          <a:blip r:embed="rId3"/>
+          <a:srcRect l="2101" t="52563" r="1778"/>
+          <a:stretch/>
+        </p:blipFill>
+        <p:spPr>
+          <a:xfrm>
+            <a:off x="342891" y="0"/>
+            <a:ext cx="11622024" cy="3400425"/>
+          </a:xfrm>
+          <a:prstGeom prst="rect">
+            <a:avLst/>
+          </a:prstGeom>
+        </p:spPr>
+      </p:pic>
+      <p:sp>
+        <p:nvSpPr>
+          <p:cNvPr id="11" name="TextBox 10">
+            <a:extLst>
+              <a:ext uri="{FF2B5EF4-FFF2-40B4-BE49-F238E27FC236}">
+                <a16:creationId xmlns:a16="http://schemas.microsoft.com/office/drawing/2014/main" id="{DEC0DD4D-ED3C-AF4B-A34B-A271E177B9D6}"/>
+              </a:ext>
+            </a:extLst>
+          </p:cNvPr>
+          <p:cNvSpPr txBox="1"/>
+          <p:nvPr/>
+        </p:nvSpPr>
+        <p:spPr>
+          <a:xfrm rot="16200000">
+            <a:off x="5314028" y="1091097"/>
+            <a:ext cx="2505353" cy="692497"/>
+          </a:xfrm>
+          <a:prstGeom prst="rect">
+            <a:avLst/>
+          </a:prstGeom>
+          <a:noFill/>
+        </p:spPr>
+        <p:txBody>
+          <a:bodyPr wrap="square" rtlCol="0">
+            <a:spAutoFit/>
+          </a:bodyPr>
+          <a:lstStyle/>
+          <a:p>
+            <a:r>
+              <a:rPr lang="en-US" sz="1950" dirty="0">
+                <a:solidFill>
+                  <a:srgbClr val="262626"/>
+                </a:solidFill>
+              </a:rPr>
+              <a:t>Scen. 1: EKNR values</a:t>
+            </a:r>
+          </a:p>
+          <a:p>
+            <a:endParaRPr lang="en-US" sz="1950" dirty="0">
+              <a:solidFill>
+                <a:srgbClr val="262626"/>
+              </a:solidFill>
+            </a:endParaRPr>
+          </a:p>
+        </p:txBody>
+      </p:sp>
+      <p:sp>
+        <p:nvSpPr>
+          <p:cNvPr id="12" name="TextBox 11">
+            <a:extLst>
+              <a:ext uri="{FF2B5EF4-FFF2-40B4-BE49-F238E27FC236}">
+                <a16:creationId xmlns:a16="http://schemas.microsoft.com/office/drawing/2014/main" id="{4A70ADCA-D65A-9548-8F65-501109A0E7D7}"/>
+              </a:ext>
+            </a:extLst>
+          </p:cNvPr>
+          <p:cNvSpPr txBox="1"/>
+          <p:nvPr/>
+        </p:nvSpPr>
+        <p:spPr>
+          <a:xfrm rot="16200000">
+            <a:off x="-783465" y="1090664"/>
+            <a:ext cx="2505353" cy="692497"/>
+          </a:xfrm>
+          <a:prstGeom prst="rect">
+            <a:avLst/>
+          </a:prstGeom>
+          <a:noFill/>
+        </p:spPr>
+        <p:txBody>
+          <a:bodyPr wrap="square" rtlCol="0">
+            <a:spAutoFit/>
+          </a:bodyPr>
+          <a:lstStyle/>
+          <a:p>
+            <a:r>
+              <a:rPr lang="en-US" sz="1950" dirty="0">
+                <a:solidFill>
+                  <a:srgbClr val="262626"/>
+                </a:solidFill>
+              </a:rPr>
+              <a:t>Scen. 1: EKNR values</a:t>
+            </a:r>
+          </a:p>
+          <a:p>
+            <a:endParaRPr lang="en-US" sz="1950" dirty="0">
+              <a:solidFill>
+                <a:srgbClr val="262626"/>
+              </a:solidFill>
+            </a:endParaRPr>
+          </a:p>
+        </p:txBody>
+      </p:sp>
+    </p:spTree>
+    <p:extLst>
+      <p:ext uri="{BB962C8B-B14F-4D97-AF65-F5344CB8AC3E}">
+        <p14:creationId xmlns:p14="http://schemas.microsoft.com/office/powerpoint/2010/main" val="3732936158"/>
       </p:ext>
     </p:extLst>
   </p:cSld>

</xml_diff>